<commit_message>
udpate solution of B
</commit_message>
<xml_diff>
--- a/day0/B/solution/solution.pptx
+++ b/day0/B/solution/solution.pptx
@@ -5192,13 +5192,61 @@
                       <a:rPr kumimoji="1" lang="en-US" altLang="zh-CN" b="0" i="1" dirty="0" smtClean="0">
                         <a:latin typeface="Cambria Math" panose="02040503050406030204" pitchFamily="18" charset="0"/>
                       </a:rPr>
+                      <m:t>1</m:t>
+                    </m:r>
+                    <m:r>
+                      <a:rPr kumimoji="1" lang="en-US" altLang="zh-CN" b="0" i="1" dirty="0" smtClean="0">
+                        <a:latin typeface="Cambria Math" panose="02040503050406030204" pitchFamily="18" charset="0"/>
+                        <a:ea typeface="Cambria Math" panose="02040503050406030204" pitchFamily="18" charset="0"/>
+                      </a:rPr>
+                      <m:t>≤</m:t>
+                    </m:r>
+                    <m:r>
+                      <a:rPr kumimoji="1" lang="en-US" altLang="zh-CN" b="0" i="1" dirty="0" smtClean="0">
+                        <a:latin typeface="Cambria Math" panose="02040503050406030204" pitchFamily="18" charset="0"/>
+                      </a:rPr>
                       <m:t>𝑥</m:t>
                     </m:r>
                     <m:r>
                       <a:rPr kumimoji="1" lang="en-US" altLang="zh-CN" b="0" i="1" dirty="0" smtClean="0">
                         <a:latin typeface="Cambria Math" panose="02040503050406030204" pitchFamily="18" charset="0"/>
+                        <a:ea typeface="Cambria Math" panose="02040503050406030204" pitchFamily="18" charset="0"/>
                       </a:rPr>
-                      <m:t>&gt;0)</m:t>
+                      <m:t>≤</m:t>
+                    </m:r>
+                    <m:sSup>
+                      <m:sSupPr>
+                        <m:ctrlPr>
+                          <a:rPr kumimoji="1" lang="en-US" altLang="zh-CN" b="0" i="1" dirty="0" smtClean="0">
+                            <a:latin typeface="Cambria Math" panose="02040503050406030204" pitchFamily="18" charset="0"/>
+                            <a:ea typeface="Cambria Math" panose="02040503050406030204" pitchFamily="18" charset="0"/>
+                          </a:rPr>
+                        </m:ctrlPr>
+                      </m:sSupPr>
+                      <m:e>
+                        <m:r>
+                          <a:rPr kumimoji="1" lang="en-US" altLang="zh-CN" b="0" i="1" dirty="0" smtClean="0">
+                            <a:latin typeface="Cambria Math" panose="02040503050406030204" pitchFamily="18" charset="0"/>
+                            <a:ea typeface="Cambria Math" panose="02040503050406030204" pitchFamily="18" charset="0"/>
+                          </a:rPr>
+                          <m:t>10</m:t>
+                        </m:r>
+                      </m:e>
+                      <m:sup>
+                        <m:r>
+                          <a:rPr kumimoji="1" lang="en-US" altLang="zh-CN" b="0" i="1" dirty="0" smtClean="0">
+                            <a:latin typeface="Cambria Math" panose="02040503050406030204" pitchFamily="18" charset="0"/>
+                            <a:ea typeface="Cambria Math" panose="02040503050406030204" pitchFamily="18" charset="0"/>
+                          </a:rPr>
+                          <m:t>8</m:t>
+                        </m:r>
+                      </m:sup>
+                    </m:sSup>
+                    <m:r>
+                      <a:rPr kumimoji="1" lang="en-US" altLang="zh-CN" b="0" i="1" dirty="0" smtClean="0">
+                        <a:latin typeface="Cambria Math" panose="02040503050406030204" pitchFamily="18" charset="0"/>
+                      </a:rPr>
+                      <m:t>)</m:t>
                     </m:r>
                   </m:oMath>
                 </a14:m>
@@ -5215,20 +5263,17 @@
                     <m:sSub>
                       <m:sSubPr>
                         <m:ctrlPr>
-                          <a:rPr kumimoji="1" lang="en-US" altLang="zh-CN" i="1" smtClean="0">
+                          <a:rPr kumimoji="1" lang="en-US" altLang="zh-CN" b="0" i="1" smtClean="0">
                             <a:latin typeface="Cambria Math" panose="02040503050406030204" pitchFamily="18" charset="0"/>
                           </a:rPr>
                         </m:ctrlPr>
                       </m:sSubPr>
                       <m:e>
                         <m:r>
-                          <m:rPr>
-                            <m:sty m:val="p"/>
-                          </m:rPr>
-                          <a:rPr kumimoji="1" lang="en-US" altLang="zh-CN" i="1">
+                          <a:rPr kumimoji="1" lang="en-US" altLang="zh-CN" b="0" i="1" smtClean="0">
                             <a:latin typeface="Cambria Math" panose="02040503050406030204" pitchFamily="18" charset="0"/>
                           </a:rPr>
-                          <m:t>a</m:t>
+                          <m:t>𝑎</m:t>
                         </m:r>
                       </m:e>
                       <m:sub>
@@ -5469,6 +5514,19 @@
                       <a:rPr kumimoji="1" lang="en-US" altLang="zh-CN" b="0" i="1" smtClean="0">
                         <a:latin typeface="Cambria Math" panose="02040503050406030204" pitchFamily="18" charset="0"/>
                       </a:rPr>
+                      <m:t>1</m:t>
+                    </m:r>
+                    <m:r>
+                      <a:rPr kumimoji="1" lang="en-US" altLang="zh-CN" b="0" i="1" smtClean="0">
+                        <a:latin typeface="Cambria Math" panose="02040503050406030204" pitchFamily="18" charset="0"/>
+                        <a:ea typeface="Cambria Math" panose="02040503050406030204" pitchFamily="18" charset="0"/>
+                      </a:rPr>
+                      <m:t>≤</m:t>
+                    </m:r>
+                    <m:r>
+                      <a:rPr kumimoji="1" lang="en-US" altLang="zh-CN" b="0" i="1" smtClean="0">
+                        <a:latin typeface="Cambria Math" panose="02040503050406030204" pitchFamily="18" charset="0"/>
+                      </a:rPr>
                       <m:t>𝑛</m:t>
                     </m:r>
                     <m:r>
@@ -5627,8 +5685,8 @@
           <a:chExt cx="0" cy="0"/>
         </a:xfrm>
       </p:grpSpPr>
-      <mc:AlternateContent xmlns:mc="http://schemas.openxmlformats.org/markup-compatibility/2006">
-        <mc:Choice xmlns:a14="http://schemas.microsoft.com/office/drawing/2010/main" Requires="a14">
+      <mc:AlternateContent xmlns:mc="http://schemas.openxmlformats.org/markup-compatibility/2006" xmlns:a14="http://schemas.microsoft.com/office/drawing/2010/main">
+        <mc:Choice Requires="a14">
           <p:sp>
             <p:nvSpPr>
               <p:cNvPr id="2" name="内容占位符 1">
@@ -5779,7 +5837,7 @@
             </p:txBody>
           </p:sp>
         </mc:Choice>
-        <mc:Fallback>
+        <mc:Fallback xmlns="">
           <p:sp>
             <p:nvSpPr>
               <p:cNvPr id="2" name="内容占位符 1">

</xml_diff>